<commit_message>
Continue working on ppt
</commit_message>
<xml_diff>
--- a/RailML_Dashboard.pptx
+++ b/RailML_Dashboard.pptx
@@ -5,15 +5,21 @@
     <p:sldMasterId id="2147483660" r:id="rId1"/>
   </p:sldMasterIdLst>
   <p:notesMasterIdLst>
-    <p:notesMasterId r:id="rId5"/>
+    <p:notesMasterId r:id="rId11"/>
   </p:notesMasterIdLst>
   <p:handoutMasterIdLst>
-    <p:handoutMasterId r:id="rId6"/>
+    <p:handoutMasterId r:id="rId12"/>
   </p:handoutMasterIdLst>
   <p:sldIdLst>
     <p:sldId id="256" r:id="rId2"/>
     <p:sldId id="257" r:id="rId3"/>
     <p:sldId id="258" r:id="rId4"/>
+    <p:sldId id="259" r:id="rId5"/>
+    <p:sldId id="260" r:id="rId6"/>
+    <p:sldId id="261" r:id="rId7"/>
+    <p:sldId id="262" r:id="rId8"/>
+    <p:sldId id="263" r:id="rId9"/>
+    <p:sldId id="264" r:id="rId10"/>
   </p:sldIdLst>
   <p:sldSz cx="12192000" cy="6858000"/>
   <p:notesSz cx="6858000" cy="9144000"/>
@@ -3705,13 +3711,16 @@
             </a:r>
           </a:p>
           <a:p>
-            <a:endParaRPr lang="es-ES" dirty="0" smtClean="0">
-              <a:latin typeface="Georgia" panose="02040502050405020303" pitchFamily="18" charset="0"/>
-            </a:endParaRPr>
-          </a:p>
-          <a:p>
-            <a:r>
-              <a:rPr lang="es-ES" dirty="0" smtClean="0">
+            <a:r>
+              <a:rPr lang="es-ES" smtClean="0">
+                <a:latin typeface="Georgia" panose="02040502050405020303" pitchFamily="18" charset="0"/>
+              </a:rPr>
+              <a:t>Tutor: Julio Marcelo Martí</a:t>
+            </a:r>
+          </a:p>
+          <a:p>
+            <a:r>
+              <a:rPr lang="es-ES" smtClean="0">
                 <a:latin typeface="Georgia" panose="02040502050405020303" pitchFamily="18" charset="0"/>
               </a:rPr>
               <a:t>Máster Universitario en Análisis y Visualización de Datos Masivos</a:t>
@@ -3910,15 +3919,20 @@
           </a:p>
           <a:p>
             <a:r>
+              <a:rPr lang="es-ES" smtClean="0"/>
+              <a:t>Metodología y descripción </a:t>
+            </a:r>
+            <a:r>
               <a:rPr lang="es-ES" dirty="0" smtClean="0"/>
-              <a:t>Descripción de la herramienta</a:t>
-            </a:r>
-          </a:p>
-          <a:p>
-            <a:r>
-              <a:rPr lang="es-ES" dirty="0" smtClean="0"/>
-              <a:t>Demo web</a:t>
-            </a:r>
+              <a:t>de la herramienta</a:t>
+            </a:r>
+          </a:p>
+          <a:p>
+            <a:r>
+              <a:rPr lang="es-ES" smtClean="0"/>
+              <a:t>Demo</a:t>
+            </a:r>
+            <a:endParaRPr lang="es-ES" dirty="0" smtClean="0"/>
           </a:p>
           <a:p>
             <a:r>
@@ -4098,30 +4112,63 @@
         </p:nvSpPr>
         <p:spPr>
           <a:xfrm>
-            <a:off x="838200" y="1825625"/>
-            <a:ext cx="10515600" cy="3112135"/>
-          </a:xfrm>
-        </p:spPr>
-        <p:txBody>
-          <a:bodyPr/>
-          <a:lstStyle/>
-          <a:p>
-            <a:r>
-              <a:rPr lang="es-ES" dirty="0" smtClean="0"/>
-              <a:t>Herramienta de visualización de datos</a:t>
-            </a:r>
-          </a:p>
-          <a:p>
-            <a:r>
-              <a:rPr lang="es-ES" dirty="0" smtClean="0"/>
-              <a:t>Aplicación web</a:t>
-            </a:r>
-          </a:p>
-          <a:p>
-            <a:r>
-              <a:rPr lang="es-ES" dirty="0" smtClean="0"/>
-              <a:t>Datos de sistemas de seguridad ferroviarios</a:t>
-            </a:r>
+            <a:off x="838200" y="1545465"/>
+            <a:ext cx="10515600" cy="3392295"/>
+          </a:xfrm>
+        </p:spPr>
+        <p:txBody>
+          <a:bodyPr>
+            <a:normAutofit/>
+          </a:bodyPr>
+          <a:lstStyle/>
+          <a:p>
+            <a:r>
+              <a:rPr lang="es-ES" smtClean="0"/>
+              <a:t>Infinidad datos </a:t>
+            </a:r>
+            <a:r>
+              <a:rPr lang="es-ES"/>
+              <a:t>de sistemas de seguridad y </a:t>
+            </a:r>
+            <a:r>
+              <a:rPr lang="es-ES"/>
+              <a:t>señalización </a:t>
+            </a:r>
+            <a:r>
+              <a:rPr lang="es-ES" smtClean="0"/>
+              <a:t>ferroviaria</a:t>
+            </a:r>
+          </a:p>
+          <a:p>
+            <a:r>
+              <a:rPr lang="es-ES" smtClean="0"/>
+              <a:t>Muy extensos</a:t>
+            </a:r>
+          </a:p>
+          <a:p>
+            <a:r>
+              <a:rPr lang="es-ES"/>
+              <a:t>R</a:t>
+            </a:r>
+            <a:r>
+              <a:rPr lang="es-ES" smtClean="0"/>
+              <a:t>esulta tedioso trabajar con ellos</a:t>
+            </a:r>
+          </a:p>
+          <a:p>
+            <a:r>
+              <a:rPr lang="es-ES" smtClean="0"/>
+              <a:t>Dificil hacerse una idea del alcance que guardan los datos</a:t>
+            </a:r>
+          </a:p>
+          <a:p>
+            <a:r>
+              <a:rPr lang="es-ES" smtClean="0"/>
+              <a:t>Cada empresa utiliza formatos diferentes</a:t>
+            </a:r>
+          </a:p>
+          <a:p>
+            <a:endParaRPr lang="es-ES" dirty="0" smtClean="0"/>
           </a:p>
           <a:p>
             <a:endParaRPr lang="es-ES" dirty="0"/>
@@ -4228,6 +4275,1620 @@
       </p:par>
     </p:tnLst>
   </p:timing>
+</p:sld>
+</file>
+
+<file path=ppt/slides/slide4.xml><?xml version="1.0" encoding="utf-8"?>
+<p:sld xmlns:a="http://schemas.openxmlformats.org/drawingml/2006/main" xmlns:r="http://schemas.openxmlformats.org/officeDocument/2006/relationships" xmlns:p="http://schemas.openxmlformats.org/presentationml/2006/main">
+  <p:cSld>
+    <p:spTree>
+      <p:nvGrpSpPr>
+        <p:cNvPr id="1" name=""/>
+        <p:cNvGrpSpPr/>
+        <p:nvPr/>
+      </p:nvGrpSpPr>
+      <p:grpSpPr>
+        <a:xfrm>
+          <a:off x="0" y="0"/>
+          <a:ext cx="0" cy="0"/>
+          <a:chOff x="0" y="0"/>
+          <a:chExt cx="0" cy="0"/>
+        </a:xfrm>
+      </p:grpSpPr>
+      <p:sp>
+        <p:nvSpPr>
+          <p:cNvPr id="3" name="Marcador de contenido 2"/>
+          <p:cNvSpPr>
+            <a:spLocks noGrp="1"/>
+          </p:cNvSpPr>
+          <p:nvPr>
+            <p:ph idx="1"/>
+          </p:nvPr>
+        </p:nvSpPr>
+        <p:spPr>
+          <a:xfrm>
+            <a:off x="838200" y="1467167"/>
+            <a:ext cx="10515600" cy="3967718"/>
+          </a:xfrm>
+        </p:spPr>
+        <p:txBody>
+          <a:bodyPr/>
+          <a:lstStyle/>
+          <a:p>
+            <a:r>
+              <a:rPr lang="es-ES" smtClean="0"/>
+              <a:t>Objetivo: </a:t>
+            </a:r>
+            <a:r>
+              <a:rPr lang="es-ES"/>
+              <a:t>solucionar el problema de interpretación de </a:t>
+            </a:r>
+            <a:r>
+              <a:rPr lang="es-ES"/>
+              <a:t>los </a:t>
+            </a:r>
+            <a:r>
+              <a:rPr lang="es-ES" smtClean="0"/>
+              <a:t>datos</a:t>
+            </a:r>
+          </a:p>
+          <a:p>
+            <a:r>
+              <a:rPr lang="es-ES" smtClean="0"/>
+              <a:t>Conseguir una visión general de lo que ocultan los datos</a:t>
+            </a:r>
+          </a:p>
+          <a:p>
+            <a:r>
+              <a:rPr lang="es-ES" smtClean="0"/>
+              <a:t>Representación gráfica de los datos</a:t>
+            </a:r>
+          </a:p>
+          <a:p>
+            <a:endParaRPr lang="es-ES"/>
+          </a:p>
+          <a:p>
+            <a:endParaRPr lang="es-ES"/>
+          </a:p>
+        </p:txBody>
+      </p:sp>
+      <p:sp>
+        <p:nvSpPr>
+          <p:cNvPr id="4" name="Marcador de pie de página 3"/>
+          <p:cNvSpPr>
+            <a:spLocks noGrp="1"/>
+          </p:cNvSpPr>
+          <p:nvPr>
+            <p:ph type="ftr" sz="quarter" idx="11"/>
+          </p:nvPr>
+        </p:nvSpPr>
+        <p:spPr/>
+        <p:txBody>
+          <a:bodyPr/>
+          <a:lstStyle/>
+          <a:p>
+            <a:r>
+              <a:rPr lang="es-ES" smtClean="0"/>
+              <a:t>Máster Universitario en Análisis y Visualización de Datos Masivos</a:t>
+            </a:r>
+            <a:endParaRPr lang="es-ES"/>
+          </a:p>
+        </p:txBody>
+      </p:sp>
+      <p:sp>
+        <p:nvSpPr>
+          <p:cNvPr id="5" name="Título 1"/>
+          <p:cNvSpPr txBox="1">
+            <a:spLocks/>
+          </p:cNvSpPr>
+          <p:nvPr/>
+        </p:nvSpPr>
+        <p:spPr>
+          <a:xfrm>
+            <a:off x="838200" y="365125"/>
+            <a:ext cx="10515600" cy="1325563"/>
+          </a:xfrm>
+          <a:prstGeom prst="rect">
+            <a:avLst/>
+          </a:prstGeom>
+        </p:spPr>
+        <p:txBody>
+          <a:bodyPr vert="horz" lIns="91440" tIns="45720" rIns="91440" bIns="45720" rtlCol="0" anchor="ctr">
+            <a:normAutofit/>
+          </a:bodyPr>
+          <a:lstStyle>
+            <a:lvl1pPr algn="l" defTabSz="914400" rtl="0" eaLnBrk="1" latinLnBrk="0" hangingPunct="1">
+              <a:lnSpc>
+                <a:spcPct val="90000"/>
+              </a:lnSpc>
+              <a:spcBef>
+                <a:spcPct val="0"/>
+              </a:spcBef>
+              <a:buNone/>
+              <a:defRPr sz="4400" kern="1200">
+                <a:solidFill>
+                  <a:schemeClr val="tx1"/>
+                </a:solidFill>
+                <a:latin typeface="+mj-lt"/>
+                <a:ea typeface="+mj-ea"/>
+                <a:cs typeface="+mj-cs"/>
+              </a:defRPr>
+            </a:lvl1pPr>
+          </a:lstStyle>
+          <a:p>
+            <a:r>
+              <a:rPr lang="es-ES" smtClean="0">
+                <a:latin typeface="Cambria" panose="02040503050406030204" pitchFamily="18" charset="0"/>
+                <a:ea typeface="Cambria" panose="02040503050406030204" pitchFamily="18" charset="0"/>
+              </a:rPr>
+              <a:t>Introducción</a:t>
+            </a:r>
+            <a:endParaRPr lang="es-ES" dirty="0"/>
+          </a:p>
+        </p:txBody>
+      </p:sp>
+      <p:sp>
+        <p:nvSpPr>
+          <p:cNvPr id="6" name="CuadroTexto 5"/>
+          <p:cNvSpPr txBox="1"/>
+          <p:nvPr/>
+        </p:nvSpPr>
+        <p:spPr>
+          <a:xfrm>
+            <a:off x="0" y="5528604"/>
+            <a:ext cx="12192000" cy="335388"/>
+          </a:xfrm>
+          <a:prstGeom prst="rect">
+            <a:avLst/>
+          </a:prstGeom>
+          <a:solidFill>
+            <a:schemeClr val="accent1">
+              <a:lumMod val="75000"/>
+            </a:schemeClr>
+          </a:solidFill>
+        </p:spPr>
+        <p:txBody>
+          <a:bodyPr wrap="square" rtlCol="0">
+            <a:spAutoFit/>
+          </a:bodyPr>
+          <a:lstStyle/>
+          <a:p>
+            <a:endParaRPr lang="es-ES" sz="1200" dirty="0"/>
+          </a:p>
+        </p:txBody>
+      </p:sp>
+      <p:pic>
+        <p:nvPicPr>
+          <p:cNvPr id="7" name="Imagen 6" descr="https://www.unir.net/wp-content/uploads/2017/04/logo-h-768x463.png"/>
+          <p:cNvPicPr/>
+          <p:nvPr/>
+        </p:nvPicPr>
+        <p:blipFill>
+          <a:blip r:embed="rId2"/>
+          <a:srcRect t="20870" b="25652"/>
+          <a:stretch>
+            <a:fillRect/>
+          </a:stretch>
+        </p:blipFill>
+        <p:spPr bwMode="auto">
+          <a:xfrm>
+            <a:off x="8856897" y="5818505"/>
+            <a:ext cx="2804160" cy="902970"/>
+          </a:xfrm>
+          <a:prstGeom prst="rect">
+            <a:avLst/>
+          </a:prstGeom>
+          <a:noFill/>
+          <a:ln w="9525">
+            <a:noFill/>
+            <a:miter lim="800000"/>
+            <a:headEnd/>
+            <a:tailEnd/>
+          </a:ln>
+        </p:spPr>
+      </p:pic>
+    </p:spTree>
+    <p:extLst>
+      <p:ext uri="{BB962C8B-B14F-4D97-AF65-F5344CB8AC3E}">
+        <p14:creationId xmlns:p14="http://schemas.microsoft.com/office/powerpoint/2010/main" val="3090746047"/>
+      </p:ext>
+    </p:extLst>
+  </p:cSld>
+  <p:clrMapOvr>
+    <a:masterClrMapping/>
+  </p:clrMapOvr>
+</p:sld>
+</file>
+
+<file path=ppt/slides/slide5.xml><?xml version="1.0" encoding="utf-8"?>
+<p:sld xmlns:a="http://schemas.openxmlformats.org/drawingml/2006/main" xmlns:r="http://schemas.openxmlformats.org/officeDocument/2006/relationships" xmlns:p="http://schemas.openxmlformats.org/presentationml/2006/main">
+  <p:cSld>
+    <p:spTree>
+      <p:nvGrpSpPr>
+        <p:cNvPr id="1" name=""/>
+        <p:cNvGrpSpPr/>
+        <p:nvPr/>
+      </p:nvGrpSpPr>
+      <p:grpSpPr>
+        <a:xfrm>
+          <a:off x="0" y="0"/>
+          <a:ext cx="0" cy="0"/>
+          <a:chOff x="0" y="0"/>
+          <a:chExt cx="0" cy="0"/>
+        </a:xfrm>
+      </p:grpSpPr>
+      <p:sp>
+        <p:nvSpPr>
+          <p:cNvPr id="3" name="Marcador de contenido 2"/>
+          <p:cNvSpPr>
+            <a:spLocks noGrp="1"/>
+          </p:cNvSpPr>
+          <p:nvPr>
+            <p:ph idx="1"/>
+          </p:nvPr>
+        </p:nvSpPr>
+        <p:spPr>
+          <a:xfrm>
+            <a:off x="838200" y="1825625"/>
+            <a:ext cx="10515600" cy="3454713"/>
+          </a:xfrm>
+        </p:spPr>
+        <p:txBody>
+          <a:bodyPr/>
+          <a:lstStyle/>
+          <a:p>
+            <a:r>
+              <a:rPr lang="es-ES" smtClean="0"/>
+              <a:t>Objetivo de RailML: </a:t>
+            </a:r>
+          </a:p>
+          <a:p>
+            <a:pPr marL="457200" lvl="1" indent="0">
+              <a:buNone/>
+            </a:pPr>
+            <a:r>
+              <a:rPr lang="es-ES" smtClean="0"/>
+              <a:t>Conseguir un estándar </a:t>
+            </a:r>
+            <a:r>
+              <a:rPr lang="es-ES"/>
+              <a:t>industrial europeo para el intercambio de </a:t>
+            </a:r>
+            <a:r>
+              <a:rPr lang="es-ES"/>
+              <a:t>datos </a:t>
+            </a:r>
+            <a:r>
+              <a:rPr lang="es-ES" smtClean="0"/>
+              <a:t>ferroviarios</a:t>
+            </a:r>
+            <a:endParaRPr lang="es-ES"/>
+          </a:p>
+          <a:p>
+            <a:pPr marL="228600" lvl="1">
+              <a:spcBef>
+                <a:spcPts val="1000"/>
+              </a:spcBef>
+            </a:pPr>
+            <a:r>
+              <a:rPr lang="es-ES" sz="2800"/>
+              <a:t>Iniciativa fundada en 2002</a:t>
+            </a:r>
+          </a:p>
+          <a:p>
+            <a:pPr marL="228600" lvl="1">
+              <a:spcBef>
+                <a:spcPts val="1000"/>
+              </a:spcBef>
+            </a:pPr>
+            <a:r>
+              <a:rPr lang="es-ES" sz="2800"/>
+              <a:t>Debido a la dificultad de conectar </a:t>
+            </a:r>
+            <a:r>
+              <a:rPr lang="es-ES" sz="2800"/>
+              <a:t>diferentes </a:t>
+            </a:r>
+            <a:r>
+              <a:rPr lang="es-ES" sz="2800" smtClean="0"/>
+              <a:t>aplicaciones</a:t>
+            </a:r>
+            <a:endParaRPr lang="es-ES" sz="2800"/>
+          </a:p>
+          <a:p>
+            <a:pPr marL="228600" lvl="1">
+              <a:spcBef>
+                <a:spcPts val="1000"/>
+              </a:spcBef>
+            </a:pPr>
+            <a:r>
+              <a:rPr lang="es-ES" sz="2800" smtClean="0"/>
+              <a:t>Basado en XML</a:t>
+            </a:r>
+            <a:endParaRPr lang="es-ES" sz="2800"/>
+          </a:p>
+        </p:txBody>
+      </p:sp>
+      <p:sp>
+        <p:nvSpPr>
+          <p:cNvPr id="4" name="Marcador de pie de página 3"/>
+          <p:cNvSpPr>
+            <a:spLocks noGrp="1"/>
+          </p:cNvSpPr>
+          <p:nvPr>
+            <p:ph type="ftr" sz="quarter" idx="11"/>
+          </p:nvPr>
+        </p:nvSpPr>
+        <p:spPr/>
+        <p:txBody>
+          <a:bodyPr/>
+          <a:lstStyle/>
+          <a:p>
+            <a:r>
+              <a:rPr lang="es-ES" smtClean="0"/>
+              <a:t>Máster Universitario en Análisis y Visualización de Datos Masivos</a:t>
+            </a:r>
+            <a:endParaRPr lang="es-ES"/>
+          </a:p>
+        </p:txBody>
+      </p:sp>
+      <p:sp>
+        <p:nvSpPr>
+          <p:cNvPr id="5" name="Título 1"/>
+          <p:cNvSpPr txBox="1">
+            <a:spLocks/>
+          </p:cNvSpPr>
+          <p:nvPr/>
+        </p:nvSpPr>
+        <p:spPr>
+          <a:xfrm>
+            <a:off x="838200" y="365125"/>
+            <a:ext cx="10515600" cy="1325563"/>
+          </a:xfrm>
+          <a:prstGeom prst="rect">
+            <a:avLst/>
+          </a:prstGeom>
+        </p:spPr>
+        <p:txBody>
+          <a:bodyPr vert="horz" lIns="91440" tIns="45720" rIns="91440" bIns="45720" rtlCol="0" anchor="ctr">
+            <a:normAutofit/>
+          </a:bodyPr>
+          <a:lstStyle>
+            <a:lvl1pPr algn="l" defTabSz="914400" rtl="0" eaLnBrk="1" latinLnBrk="0" hangingPunct="1">
+              <a:lnSpc>
+                <a:spcPct val="90000"/>
+              </a:lnSpc>
+              <a:spcBef>
+                <a:spcPct val="0"/>
+              </a:spcBef>
+              <a:buNone/>
+              <a:defRPr sz="4400" kern="1200">
+                <a:solidFill>
+                  <a:schemeClr val="tx1"/>
+                </a:solidFill>
+                <a:latin typeface="+mj-lt"/>
+                <a:ea typeface="+mj-ea"/>
+                <a:cs typeface="+mj-cs"/>
+              </a:defRPr>
+            </a:lvl1pPr>
+          </a:lstStyle>
+          <a:p>
+            <a:r>
+              <a:rPr lang="es-ES" smtClean="0">
+                <a:latin typeface="Cambria" panose="02040503050406030204" pitchFamily="18" charset="0"/>
+                <a:ea typeface="Cambria" panose="02040503050406030204" pitchFamily="18" charset="0"/>
+              </a:rPr>
+              <a:t>RailML </a:t>
+            </a:r>
+            <a:endParaRPr lang="es-ES" dirty="0"/>
+          </a:p>
+        </p:txBody>
+      </p:sp>
+      <p:sp>
+        <p:nvSpPr>
+          <p:cNvPr id="6" name="CuadroTexto 5"/>
+          <p:cNvSpPr txBox="1"/>
+          <p:nvPr/>
+        </p:nvSpPr>
+        <p:spPr>
+          <a:xfrm>
+            <a:off x="0" y="5528604"/>
+            <a:ext cx="12192000" cy="335388"/>
+          </a:xfrm>
+          <a:prstGeom prst="rect">
+            <a:avLst/>
+          </a:prstGeom>
+          <a:solidFill>
+            <a:schemeClr val="accent1">
+              <a:lumMod val="75000"/>
+            </a:schemeClr>
+          </a:solidFill>
+        </p:spPr>
+        <p:txBody>
+          <a:bodyPr wrap="square" rtlCol="0">
+            <a:spAutoFit/>
+          </a:bodyPr>
+          <a:lstStyle/>
+          <a:p>
+            <a:endParaRPr lang="es-ES" sz="1200" dirty="0"/>
+          </a:p>
+        </p:txBody>
+      </p:sp>
+      <p:pic>
+        <p:nvPicPr>
+          <p:cNvPr id="7" name="Imagen 6" descr="https://www.unir.net/wp-content/uploads/2017/04/logo-h-768x463.png"/>
+          <p:cNvPicPr/>
+          <p:nvPr/>
+        </p:nvPicPr>
+        <p:blipFill>
+          <a:blip r:embed="rId2"/>
+          <a:srcRect t="20870" b="25652"/>
+          <a:stretch>
+            <a:fillRect/>
+          </a:stretch>
+        </p:blipFill>
+        <p:spPr bwMode="auto">
+          <a:xfrm>
+            <a:off x="8856897" y="5818505"/>
+            <a:ext cx="2804160" cy="902970"/>
+          </a:xfrm>
+          <a:prstGeom prst="rect">
+            <a:avLst/>
+          </a:prstGeom>
+          <a:noFill/>
+          <a:ln w="9525">
+            <a:noFill/>
+            <a:miter lim="800000"/>
+            <a:headEnd/>
+            <a:tailEnd/>
+          </a:ln>
+        </p:spPr>
+      </p:pic>
+      <p:pic>
+        <p:nvPicPr>
+          <p:cNvPr id="8" name="Imagen 7"/>
+          <p:cNvPicPr>
+            <a:picLocks noChangeAspect="1"/>
+          </p:cNvPicPr>
+          <p:nvPr/>
+        </p:nvPicPr>
+        <p:blipFill>
+          <a:blip r:embed="rId3"/>
+          <a:stretch>
+            <a:fillRect/>
+          </a:stretch>
+        </p:blipFill>
+        <p:spPr>
+          <a:xfrm>
+            <a:off x="7177021" y="500371"/>
+            <a:ext cx="2628900" cy="876300"/>
+          </a:xfrm>
+          <a:prstGeom prst="rect">
+            <a:avLst/>
+          </a:prstGeom>
+        </p:spPr>
+      </p:pic>
+    </p:spTree>
+    <p:extLst>
+      <p:ext uri="{BB962C8B-B14F-4D97-AF65-F5344CB8AC3E}">
+        <p14:creationId xmlns:p14="http://schemas.microsoft.com/office/powerpoint/2010/main" val="3329884675"/>
+      </p:ext>
+    </p:extLst>
+  </p:cSld>
+  <p:clrMapOvr>
+    <a:masterClrMapping/>
+  </p:clrMapOvr>
+  <p:timing>
+    <p:tnLst>
+      <p:par>
+        <p:cTn id="1" dur="indefinite" restart="never" nodeType="tmRoot"/>
+      </p:par>
+    </p:tnLst>
+  </p:timing>
+</p:sld>
+</file>
+
+<file path=ppt/slides/slide6.xml><?xml version="1.0" encoding="utf-8"?>
+<p:sld xmlns:a="http://schemas.openxmlformats.org/drawingml/2006/main" xmlns:r="http://schemas.openxmlformats.org/officeDocument/2006/relationships" xmlns:p="http://schemas.openxmlformats.org/presentationml/2006/main">
+  <p:cSld>
+    <p:spTree>
+      <p:nvGrpSpPr>
+        <p:cNvPr id="1" name=""/>
+        <p:cNvGrpSpPr/>
+        <p:nvPr/>
+      </p:nvGrpSpPr>
+      <p:grpSpPr>
+        <a:xfrm>
+          <a:off x="0" y="0"/>
+          <a:ext cx="0" cy="0"/>
+          <a:chOff x="0" y="0"/>
+          <a:chExt cx="0" cy="0"/>
+        </a:xfrm>
+      </p:grpSpPr>
+      <p:sp>
+        <p:nvSpPr>
+          <p:cNvPr id="3" name="Marcador de contenido 2"/>
+          <p:cNvSpPr>
+            <a:spLocks noGrp="1"/>
+          </p:cNvSpPr>
+          <p:nvPr>
+            <p:ph idx="1"/>
+          </p:nvPr>
+        </p:nvSpPr>
+        <p:spPr>
+          <a:xfrm>
+            <a:off x="838200" y="1825625"/>
+            <a:ext cx="10515600" cy="3622138"/>
+          </a:xfrm>
+        </p:spPr>
+        <p:txBody>
+          <a:bodyPr/>
+          <a:lstStyle/>
+          <a:p>
+            <a:r>
+              <a:rPr lang="es-ES" smtClean="0"/>
+              <a:t>RailML </a:t>
+            </a:r>
+            <a:r>
+              <a:rPr lang="es-ES"/>
+              <a:t>es un formato de intercambio de datos ferroviarios de </a:t>
+            </a:r>
+            <a:r>
+              <a:rPr lang="es-ES"/>
+              <a:t>código </a:t>
+            </a:r>
+            <a:r>
+              <a:rPr lang="es-ES" smtClean="0"/>
+              <a:t>abierto</a:t>
+            </a:r>
+          </a:p>
+          <a:p>
+            <a:r>
+              <a:rPr lang="es-ES_tradnl" smtClean="0"/>
+              <a:t>Esquemas </a:t>
+            </a:r>
+            <a:r>
+              <a:rPr lang="es-ES_tradnl"/>
+              <a:t>de </a:t>
+            </a:r>
+            <a:r>
+              <a:rPr lang="es-ES_tradnl" smtClean="0"/>
+              <a:t>RailML disponibles </a:t>
+            </a:r>
+            <a:r>
+              <a:rPr lang="es-ES_tradnl"/>
+              <a:t>como datos abiertos y no propietarios (“</a:t>
+            </a:r>
+            <a:r>
+              <a:rPr lang="es-ES_tradnl"/>
+              <a:t>tres </a:t>
+            </a:r>
+            <a:r>
+              <a:rPr lang="es-ES_tradnl" smtClean="0"/>
+              <a:t>estrellas”)</a:t>
+            </a:r>
+          </a:p>
+          <a:p>
+            <a:r>
+              <a:rPr lang="es-ES_tradnl"/>
+              <a:t>Esquemas de datos disponibles en: </a:t>
+            </a:r>
+            <a:r>
+              <a:rPr lang="es-ES_tradnl">
+                <a:hlinkClick r:id="rId2"/>
+              </a:rPr>
+              <a:t>https://</a:t>
+            </a:r>
+            <a:r>
+              <a:rPr lang="es-ES_tradnl">
+                <a:hlinkClick r:id="rId2"/>
+              </a:rPr>
+              <a:t>www.railml.org/en</a:t>
+            </a:r>
+            <a:r>
+              <a:rPr lang="es-ES_tradnl" smtClean="0">
+                <a:hlinkClick r:id="rId2"/>
+              </a:rPr>
+              <a:t>/</a:t>
+            </a:r>
+            <a:endParaRPr lang="es-ES_tradnl" smtClean="0"/>
+          </a:p>
+          <a:p>
+            <a:r>
+              <a:rPr lang="es-ES" smtClean="0"/>
+              <a:t>Esquemas para </a:t>
+            </a:r>
+            <a:r>
+              <a:rPr lang="es-ES"/>
+              <a:t>cuatro </a:t>
+            </a:r>
+            <a:r>
+              <a:rPr lang="es-ES"/>
+              <a:t>grandes </a:t>
+            </a:r>
+            <a:r>
+              <a:rPr lang="es-ES" smtClean="0"/>
+              <a:t>áreas:</a:t>
+            </a:r>
+          </a:p>
+          <a:p>
+            <a:pPr marL="0" indent="0">
+              <a:buNone/>
+            </a:pPr>
+            <a:r>
+              <a:rPr lang="es-ES" smtClean="0"/>
+              <a:t>	Infraestructuras, cronograma, material rodante y enclavamiento</a:t>
+            </a:r>
+            <a:endParaRPr lang="es-ES"/>
+          </a:p>
+        </p:txBody>
+      </p:sp>
+      <p:sp>
+        <p:nvSpPr>
+          <p:cNvPr id="4" name="Marcador de pie de página 3"/>
+          <p:cNvSpPr>
+            <a:spLocks noGrp="1"/>
+          </p:cNvSpPr>
+          <p:nvPr>
+            <p:ph type="ftr" sz="quarter" idx="11"/>
+          </p:nvPr>
+        </p:nvSpPr>
+        <p:spPr/>
+        <p:txBody>
+          <a:bodyPr/>
+          <a:lstStyle/>
+          <a:p>
+            <a:r>
+              <a:rPr lang="es-ES" smtClean="0"/>
+              <a:t>Máster Universitario en Análisis y Visualización de Datos Masivos</a:t>
+            </a:r>
+            <a:endParaRPr lang="es-ES"/>
+          </a:p>
+        </p:txBody>
+      </p:sp>
+      <p:sp>
+        <p:nvSpPr>
+          <p:cNvPr id="5" name="Título 1"/>
+          <p:cNvSpPr txBox="1">
+            <a:spLocks/>
+          </p:cNvSpPr>
+          <p:nvPr/>
+        </p:nvSpPr>
+        <p:spPr>
+          <a:xfrm>
+            <a:off x="838200" y="365125"/>
+            <a:ext cx="10515600" cy="1325563"/>
+          </a:xfrm>
+          <a:prstGeom prst="rect">
+            <a:avLst/>
+          </a:prstGeom>
+        </p:spPr>
+        <p:txBody>
+          <a:bodyPr vert="horz" lIns="91440" tIns="45720" rIns="91440" bIns="45720" rtlCol="0" anchor="ctr">
+            <a:normAutofit/>
+          </a:bodyPr>
+          <a:lstStyle>
+            <a:lvl1pPr algn="l" defTabSz="914400" rtl="0" eaLnBrk="1" latinLnBrk="0" hangingPunct="1">
+              <a:lnSpc>
+                <a:spcPct val="90000"/>
+              </a:lnSpc>
+              <a:spcBef>
+                <a:spcPct val="0"/>
+              </a:spcBef>
+              <a:buNone/>
+              <a:defRPr sz="4400" kern="1200">
+                <a:solidFill>
+                  <a:schemeClr val="tx1"/>
+                </a:solidFill>
+                <a:latin typeface="+mj-lt"/>
+                <a:ea typeface="+mj-ea"/>
+                <a:cs typeface="+mj-cs"/>
+              </a:defRPr>
+            </a:lvl1pPr>
+          </a:lstStyle>
+          <a:p>
+            <a:r>
+              <a:rPr lang="es-ES" smtClean="0">
+                <a:latin typeface="Cambria" panose="02040503050406030204" pitchFamily="18" charset="0"/>
+                <a:ea typeface="Cambria" panose="02040503050406030204" pitchFamily="18" charset="0"/>
+              </a:rPr>
+              <a:t>RailML </a:t>
+            </a:r>
+            <a:endParaRPr lang="es-ES" dirty="0"/>
+          </a:p>
+        </p:txBody>
+      </p:sp>
+      <p:sp>
+        <p:nvSpPr>
+          <p:cNvPr id="6" name="CuadroTexto 5"/>
+          <p:cNvSpPr txBox="1"/>
+          <p:nvPr/>
+        </p:nvSpPr>
+        <p:spPr>
+          <a:xfrm>
+            <a:off x="0" y="5528604"/>
+            <a:ext cx="12192000" cy="335388"/>
+          </a:xfrm>
+          <a:prstGeom prst="rect">
+            <a:avLst/>
+          </a:prstGeom>
+          <a:solidFill>
+            <a:schemeClr val="accent1">
+              <a:lumMod val="75000"/>
+            </a:schemeClr>
+          </a:solidFill>
+        </p:spPr>
+        <p:txBody>
+          <a:bodyPr wrap="square" rtlCol="0">
+            <a:spAutoFit/>
+          </a:bodyPr>
+          <a:lstStyle/>
+          <a:p>
+            <a:endParaRPr lang="es-ES" sz="1200" dirty="0"/>
+          </a:p>
+        </p:txBody>
+      </p:sp>
+      <p:pic>
+        <p:nvPicPr>
+          <p:cNvPr id="7" name="Imagen 6" descr="https://www.unir.net/wp-content/uploads/2017/04/logo-h-768x463.png"/>
+          <p:cNvPicPr/>
+          <p:nvPr/>
+        </p:nvPicPr>
+        <p:blipFill>
+          <a:blip r:embed="rId3"/>
+          <a:srcRect t="20870" b="25652"/>
+          <a:stretch>
+            <a:fillRect/>
+          </a:stretch>
+        </p:blipFill>
+        <p:spPr bwMode="auto">
+          <a:xfrm>
+            <a:off x="8856897" y="5818505"/>
+            <a:ext cx="2804160" cy="902970"/>
+          </a:xfrm>
+          <a:prstGeom prst="rect">
+            <a:avLst/>
+          </a:prstGeom>
+          <a:noFill/>
+          <a:ln w="9525">
+            <a:noFill/>
+            <a:miter lim="800000"/>
+            <a:headEnd/>
+            <a:tailEnd/>
+          </a:ln>
+        </p:spPr>
+      </p:pic>
+      <p:pic>
+        <p:nvPicPr>
+          <p:cNvPr id="8" name="Imagen 7"/>
+          <p:cNvPicPr>
+            <a:picLocks noChangeAspect="1"/>
+          </p:cNvPicPr>
+          <p:nvPr/>
+        </p:nvPicPr>
+        <p:blipFill>
+          <a:blip r:embed="rId4"/>
+          <a:stretch>
+            <a:fillRect/>
+          </a:stretch>
+        </p:blipFill>
+        <p:spPr>
+          <a:xfrm>
+            <a:off x="7177021" y="500371"/>
+            <a:ext cx="2628900" cy="876300"/>
+          </a:xfrm>
+          <a:prstGeom prst="rect">
+            <a:avLst/>
+          </a:prstGeom>
+        </p:spPr>
+      </p:pic>
+    </p:spTree>
+    <p:extLst>
+      <p:ext uri="{BB962C8B-B14F-4D97-AF65-F5344CB8AC3E}">
+        <p14:creationId xmlns:p14="http://schemas.microsoft.com/office/powerpoint/2010/main" val="1602850673"/>
+      </p:ext>
+    </p:extLst>
+  </p:cSld>
+  <p:clrMapOvr>
+    <a:masterClrMapping/>
+  </p:clrMapOvr>
+  <p:timing>
+    <p:tnLst>
+      <p:par>
+        <p:cTn id="1" dur="indefinite" restart="never" nodeType="tmRoot"/>
+      </p:par>
+    </p:tnLst>
+  </p:timing>
+</p:sld>
+</file>
+
+<file path=ppt/slides/slide7.xml><?xml version="1.0" encoding="utf-8"?>
+<p:sld xmlns:a="http://schemas.openxmlformats.org/drawingml/2006/main" xmlns:r="http://schemas.openxmlformats.org/officeDocument/2006/relationships" xmlns:p="http://schemas.openxmlformats.org/presentationml/2006/main">
+  <p:cSld>
+    <p:spTree>
+      <p:nvGrpSpPr>
+        <p:cNvPr id="1" name=""/>
+        <p:cNvGrpSpPr/>
+        <p:nvPr/>
+      </p:nvGrpSpPr>
+      <p:grpSpPr>
+        <a:xfrm>
+          <a:off x="0" y="0"/>
+          <a:ext cx="0" cy="0"/>
+          <a:chOff x="0" y="0"/>
+          <a:chExt cx="0" cy="0"/>
+        </a:xfrm>
+      </p:grpSpPr>
+      <p:sp>
+        <p:nvSpPr>
+          <p:cNvPr id="3" name="Marcador de contenido 2"/>
+          <p:cNvSpPr>
+            <a:spLocks noGrp="1"/>
+          </p:cNvSpPr>
+          <p:nvPr>
+            <p:ph idx="1"/>
+          </p:nvPr>
+        </p:nvSpPr>
+        <p:spPr>
+          <a:xfrm>
+            <a:off x="838200" y="1825625"/>
+            <a:ext cx="10515600" cy="3480471"/>
+          </a:xfrm>
+        </p:spPr>
+        <p:txBody>
+          <a:bodyPr>
+            <a:normAutofit lnSpcReduction="10000"/>
+          </a:bodyPr>
+          <a:lstStyle/>
+          <a:p>
+            <a:r>
+              <a:rPr lang="es-ES" smtClean="0"/>
+              <a:t>Aplicación web</a:t>
+            </a:r>
+          </a:p>
+          <a:p>
+            <a:r>
+              <a:rPr lang="es-ES" smtClean="0"/>
+              <a:t>Tecnología utilizada:</a:t>
+            </a:r>
+          </a:p>
+          <a:p>
+            <a:pPr lvl="1"/>
+            <a:r>
+              <a:rPr lang="es-ES" smtClean="0"/>
+              <a:t>Python, PyCharm</a:t>
+            </a:r>
+          </a:p>
+          <a:p>
+            <a:pPr lvl="1"/>
+            <a:r>
+              <a:rPr lang="es-ES"/>
+              <a:t>Git, </a:t>
+            </a:r>
+            <a:r>
+              <a:rPr lang="es-ES"/>
+              <a:t>GitHub </a:t>
+            </a:r>
+            <a:r>
+              <a:rPr lang="es-ES" smtClean="0"/>
+              <a:t> </a:t>
+            </a:r>
+            <a:r>
+              <a:rPr lang="es-ES" smtClean="0">
+                <a:hlinkClick r:id="rId2"/>
+              </a:rPr>
+              <a:t>https</a:t>
+            </a:r>
+            <a:r>
+              <a:rPr lang="es-ES">
+                <a:hlinkClick r:id="rId2"/>
+              </a:rPr>
+              <a:t>://</a:t>
+            </a:r>
+            <a:r>
+              <a:rPr lang="es-ES" smtClean="0">
+                <a:hlinkClick r:id="rId2"/>
+              </a:rPr>
+              <a:t>github.com/adriSM07/railMLdashboard</a:t>
+            </a:r>
+            <a:endParaRPr lang="es-ES" smtClean="0"/>
+          </a:p>
+          <a:p>
+            <a:pPr lvl="1"/>
+            <a:r>
+              <a:rPr lang="es-ES"/>
+              <a:t>Heroku</a:t>
+            </a:r>
+            <a:endParaRPr lang="es-ES" smtClean="0"/>
+          </a:p>
+          <a:p>
+            <a:pPr lvl="1"/>
+            <a:r>
+              <a:rPr lang="es-ES" smtClean="0"/>
+              <a:t>Librerías:</a:t>
+            </a:r>
+          </a:p>
+          <a:p>
+            <a:pPr lvl="2"/>
+            <a:r>
+              <a:rPr lang="es-ES" smtClean="0"/>
+              <a:t>Pandas</a:t>
+            </a:r>
+          </a:p>
+          <a:p>
+            <a:pPr lvl="2"/>
+            <a:r>
+              <a:rPr lang="es-ES" smtClean="0"/>
+              <a:t>Dash</a:t>
+            </a:r>
+          </a:p>
+          <a:p>
+            <a:pPr lvl="2"/>
+            <a:r>
+              <a:rPr lang="es-ES" smtClean="0"/>
+              <a:t>Element Tree XML</a:t>
+            </a:r>
+            <a:endParaRPr lang="es-ES"/>
+          </a:p>
+        </p:txBody>
+      </p:sp>
+      <p:sp>
+        <p:nvSpPr>
+          <p:cNvPr id="4" name="Marcador de pie de página 3"/>
+          <p:cNvSpPr>
+            <a:spLocks noGrp="1"/>
+          </p:cNvSpPr>
+          <p:nvPr>
+            <p:ph type="ftr" sz="quarter" idx="11"/>
+          </p:nvPr>
+        </p:nvSpPr>
+        <p:spPr/>
+        <p:txBody>
+          <a:bodyPr/>
+          <a:lstStyle/>
+          <a:p>
+            <a:r>
+              <a:rPr lang="es-ES" smtClean="0"/>
+              <a:t>Máster Universitario en Análisis y Visualización de Datos Masivos</a:t>
+            </a:r>
+            <a:endParaRPr lang="es-ES"/>
+          </a:p>
+        </p:txBody>
+      </p:sp>
+      <p:sp>
+        <p:nvSpPr>
+          <p:cNvPr id="5" name="Título 1"/>
+          <p:cNvSpPr txBox="1">
+            <a:spLocks/>
+          </p:cNvSpPr>
+          <p:nvPr/>
+        </p:nvSpPr>
+        <p:spPr>
+          <a:xfrm>
+            <a:off x="838200" y="365125"/>
+            <a:ext cx="10515600" cy="1325563"/>
+          </a:xfrm>
+          <a:prstGeom prst="rect">
+            <a:avLst/>
+          </a:prstGeom>
+        </p:spPr>
+        <p:txBody>
+          <a:bodyPr vert="horz" lIns="91440" tIns="45720" rIns="91440" bIns="45720" rtlCol="0" anchor="ctr">
+            <a:normAutofit/>
+          </a:bodyPr>
+          <a:lstStyle>
+            <a:lvl1pPr algn="l" defTabSz="914400" rtl="0" eaLnBrk="1" latinLnBrk="0" hangingPunct="1">
+              <a:lnSpc>
+                <a:spcPct val="90000"/>
+              </a:lnSpc>
+              <a:spcBef>
+                <a:spcPct val="0"/>
+              </a:spcBef>
+              <a:buNone/>
+              <a:defRPr sz="4400" kern="1200">
+                <a:solidFill>
+                  <a:schemeClr val="tx1"/>
+                </a:solidFill>
+                <a:latin typeface="+mj-lt"/>
+                <a:ea typeface="+mj-ea"/>
+                <a:cs typeface="+mj-cs"/>
+              </a:defRPr>
+            </a:lvl1pPr>
+          </a:lstStyle>
+          <a:p>
+            <a:r>
+              <a:rPr lang="es-ES" smtClean="0">
+                <a:latin typeface="Cambria" panose="02040503050406030204" pitchFamily="18" charset="0"/>
+                <a:ea typeface="Cambria" panose="02040503050406030204" pitchFamily="18" charset="0"/>
+              </a:rPr>
+              <a:t>Metodología y Descripción de la herramienta</a:t>
+            </a:r>
+            <a:endParaRPr lang="es-ES" dirty="0"/>
+          </a:p>
+        </p:txBody>
+      </p:sp>
+      <p:sp>
+        <p:nvSpPr>
+          <p:cNvPr id="6" name="CuadroTexto 5"/>
+          <p:cNvSpPr txBox="1"/>
+          <p:nvPr/>
+        </p:nvSpPr>
+        <p:spPr>
+          <a:xfrm>
+            <a:off x="0" y="5528604"/>
+            <a:ext cx="12192000" cy="335388"/>
+          </a:xfrm>
+          <a:prstGeom prst="rect">
+            <a:avLst/>
+          </a:prstGeom>
+          <a:solidFill>
+            <a:schemeClr val="accent1">
+              <a:lumMod val="75000"/>
+            </a:schemeClr>
+          </a:solidFill>
+        </p:spPr>
+        <p:txBody>
+          <a:bodyPr wrap="square" rtlCol="0">
+            <a:spAutoFit/>
+          </a:bodyPr>
+          <a:lstStyle/>
+          <a:p>
+            <a:endParaRPr lang="es-ES" sz="1200" dirty="0"/>
+          </a:p>
+        </p:txBody>
+      </p:sp>
+      <p:pic>
+        <p:nvPicPr>
+          <p:cNvPr id="7" name="Imagen 6" descr="https://www.unir.net/wp-content/uploads/2017/04/logo-h-768x463.png"/>
+          <p:cNvPicPr/>
+          <p:nvPr/>
+        </p:nvPicPr>
+        <p:blipFill>
+          <a:blip r:embed="rId3"/>
+          <a:srcRect t="20870" b="25652"/>
+          <a:stretch>
+            <a:fillRect/>
+          </a:stretch>
+        </p:blipFill>
+        <p:spPr bwMode="auto">
+          <a:xfrm>
+            <a:off x="8856897" y="5818505"/>
+            <a:ext cx="2804160" cy="902970"/>
+          </a:xfrm>
+          <a:prstGeom prst="rect">
+            <a:avLst/>
+          </a:prstGeom>
+          <a:noFill/>
+          <a:ln w="9525">
+            <a:noFill/>
+            <a:miter lim="800000"/>
+            <a:headEnd/>
+            <a:tailEnd/>
+          </a:ln>
+        </p:spPr>
+      </p:pic>
+      <p:pic>
+        <p:nvPicPr>
+          <p:cNvPr id="8" name="Imagen 7"/>
+          <p:cNvPicPr>
+            <a:picLocks noChangeAspect="1"/>
+          </p:cNvPicPr>
+          <p:nvPr/>
+        </p:nvPicPr>
+        <p:blipFill>
+          <a:blip r:embed="rId4"/>
+          <a:stretch>
+            <a:fillRect/>
+          </a:stretch>
+        </p:blipFill>
+        <p:spPr>
+          <a:xfrm>
+            <a:off x="10514504" y="1243662"/>
+            <a:ext cx="651342" cy="659237"/>
+          </a:xfrm>
+          <a:prstGeom prst="rect">
+            <a:avLst/>
+          </a:prstGeom>
+        </p:spPr>
+      </p:pic>
+      <p:pic>
+        <p:nvPicPr>
+          <p:cNvPr id="9" name="Imagen 8"/>
+          <p:cNvPicPr>
+            <a:picLocks noChangeAspect="1"/>
+          </p:cNvPicPr>
+          <p:nvPr/>
+        </p:nvPicPr>
+        <p:blipFill>
+          <a:blip r:embed="rId5"/>
+          <a:stretch>
+            <a:fillRect/>
+          </a:stretch>
+        </p:blipFill>
+        <p:spPr>
+          <a:xfrm>
+            <a:off x="10432421" y="2359808"/>
+            <a:ext cx="733425" cy="723900"/>
+          </a:xfrm>
+          <a:prstGeom prst="rect">
+            <a:avLst/>
+          </a:prstGeom>
+        </p:spPr>
+      </p:pic>
+      <p:pic>
+        <p:nvPicPr>
+          <p:cNvPr id="10" name="Imagen 9"/>
+          <p:cNvPicPr>
+            <a:picLocks noChangeAspect="1"/>
+          </p:cNvPicPr>
+          <p:nvPr/>
+        </p:nvPicPr>
+        <p:blipFill>
+          <a:blip r:embed="rId6"/>
+          <a:stretch>
+            <a:fillRect/>
+          </a:stretch>
+        </p:blipFill>
+        <p:spPr>
+          <a:xfrm>
+            <a:off x="9860921" y="4280978"/>
+            <a:ext cx="1304925" cy="457200"/>
+          </a:xfrm>
+          <a:prstGeom prst="rect">
+            <a:avLst/>
+          </a:prstGeom>
+        </p:spPr>
+      </p:pic>
+      <p:pic>
+        <p:nvPicPr>
+          <p:cNvPr id="11" name="Imagen 10"/>
+          <p:cNvPicPr>
+            <a:picLocks noChangeAspect="1"/>
+          </p:cNvPicPr>
+          <p:nvPr/>
+        </p:nvPicPr>
+        <p:blipFill>
+          <a:blip r:embed="rId7"/>
+          <a:stretch>
+            <a:fillRect/>
+          </a:stretch>
+        </p:blipFill>
+        <p:spPr>
+          <a:xfrm>
+            <a:off x="10246683" y="3496404"/>
+            <a:ext cx="1104900" cy="428625"/>
+          </a:xfrm>
+          <a:prstGeom prst="rect">
+            <a:avLst/>
+          </a:prstGeom>
+        </p:spPr>
+      </p:pic>
+    </p:spTree>
+    <p:extLst>
+      <p:ext uri="{BB962C8B-B14F-4D97-AF65-F5344CB8AC3E}">
+        <p14:creationId xmlns:p14="http://schemas.microsoft.com/office/powerpoint/2010/main" val="1474262059"/>
+      </p:ext>
+    </p:extLst>
+  </p:cSld>
+  <p:clrMapOvr>
+    <a:masterClrMapping/>
+  </p:clrMapOvr>
+</p:sld>
+</file>
+
+<file path=ppt/slides/slide8.xml><?xml version="1.0" encoding="utf-8"?>
+<p:sld xmlns:a="http://schemas.openxmlformats.org/drawingml/2006/main" xmlns:r="http://schemas.openxmlformats.org/officeDocument/2006/relationships" xmlns:p="http://schemas.openxmlformats.org/presentationml/2006/main">
+  <p:cSld>
+    <p:spTree>
+      <p:nvGrpSpPr>
+        <p:cNvPr id="1" name=""/>
+        <p:cNvGrpSpPr/>
+        <p:nvPr/>
+      </p:nvGrpSpPr>
+      <p:grpSpPr>
+        <a:xfrm>
+          <a:off x="0" y="0"/>
+          <a:ext cx="0" cy="0"/>
+          <a:chOff x="0" y="0"/>
+          <a:chExt cx="0" cy="0"/>
+        </a:xfrm>
+      </p:grpSpPr>
+      <p:sp>
+        <p:nvSpPr>
+          <p:cNvPr id="3" name="Marcador de contenido 2"/>
+          <p:cNvSpPr>
+            <a:spLocks noGrp="1"/>
+          </p:cNvSpPr>
+          <p:nvPr>
+            <p:ph idx="1"/>
+          </p:nvPr>
+        </p:nvSpPr>
+        <p:spPr>
+          <a:xfrm>
+            <a:off x="838200" y="1825625"/>
+            <a:ext cx="10515600" cy="3531986"/>
+          </a:xfrm>
+        </p:spPr>
+        <p:txBody>
+          <a:bodyPr/>
+          <a:lstStyle/>
+          <a:p>
+            <a:r>
+              <a:rPr lang="es-ES" smtClean="0"/>
+              <a:t>Pasos en la implementación:</a:t>
+            </a:r>
+          </a:p>
+          <a:p>
+            <a:pPr lvl="1"/>
+            <a:r>
+              <a:rPr lang="es-ES" smtClean="0"/>
+              <a:t>Lectura de datos</a:t>
+            </a:r>
+          </a:p>
+          <a:p>
+            <a:pPr lvl="1"/>
+            <a:r>
+              <a:rPr lang="es-ES" smtClean="0"/>
+              <a:t>División en data frames</a:t>
+            </a:r>
+          </a:p>
+          <a:p>
+            <a:pPr lvl="1"/>
+            <a:r>
+              <a:rPr lang="es-ES" smtClean="0"/>
+              <a:t>Limpieza</a:t>
+            </a:r>
+          </a:p>
+          <a:p>
+            <a:pPr lvl="1"/>
+            <a:r>
+              <a:rPr lang="es-ES" smtClean="0"/>
+              <a:t>Visualización</a:t>
+            </a:r>
+          </a:p>
+          <a:p>
+            <a:endParaRPr lang="es-ES" smtClean="0"/>
+          </a:p>
+          <a:p>
+            <a:pPr lvl="1"/>
+            <a:endParaRPr lang="es-ES" smtClean="0"/>
+          </a:p>
+        </p:txBody>
+      </p:sp>
+      <p:sp>
+        <p:nvSpPr>
+          <p:cNvPr id="4" name="Marcador de pie de página 3"/>
+          <p:cNvSpPr>
+            <a:spLocks noGrp="1"/>
+          </p:cNvSpPr>
+          <p:nvPr>
+            <p:ph type="ftr" sz="quarter" idx="11"/>
+          </p:nvPr>
+        </p:nvSpPr>
+        <p:spPr/>
+        <p:txBody>
+          <a:bodyPr/>
+          <a:lstStyle/>
+          <a:p>
+            <a:r>
+              <a:rPr lang="es-ES" smtClean="0"/>
+              <a:t>Máster Universitario en Análisis y Visualización de Datos Masivos</a:t>
+            </a:r>
+            <a:endParaRPr lang="es-ES"/>
+          </a:p>
+        </p:txBody>
+      </p:sp>
+      <p:sp>
+        <p:nvSpPr>
+          <p:cNvPr id="5" name="Título 1"/>
+          <p:cNvSpPr txBox="1">
+            <a:spLocks/>
+          </p:cNvSpPr>
+          <p:nvPr/>
+        </p:nvSpPr>
+        <p:spPr>
+          <a:xfrm>
+            <a:off x="838200" y="365125"/>
+            <a:ext cx="10515600" cy="1325563"/>
+          </a:xfrm>
+          <a:prstGeom prst="rect">
+            <a:avLst/>
+          </a:prstGeom>
+        </p:spPr>
+        <p:txBody>
+          <a:bodyPr vert="horz" lIns="91440" tIns="45720" rIns="91440" bIns="45720" rtlCol="0" anchor="ctr">
+            <a:normAutofit/>
+          </a:bodyPr>
+          <a:lstStyle>
+            <a:lvl1pPr algn="l" defTabSz="914400" rtl="0" eaLnBrk="1" latinLnBrk="0" hangingPunct="1">
+              <a:lnSpc>
+                <a:spcPct val="90000"/>
+              </a:lnSpc>
+              <a:spcBef>
+                <a:spcPct val="0"/>
+              </a:spcBef>
+              <a:buNone/>
+              <a:defRPr sz="4400" kern="1200">
+                <a:solidFill>
+                  <a:schemeClr val="tx1"/>
+                </a:solidFill>
+                <a:latin typeface="+mj-lt"/>
+                <a:ea typeface="+mj-ea"/>
+                <a:cs typeface="+mj-cs"/>
+              </a:defRPr>
+            </a:lvl1pPr>
+          </a:lstStyle>
+          <a:p>
+            <a:r>
+              <a:rPr lang="es-ES" smtClean="0">
+                <a:latin typeface="Cambria" panose="02040503050406030204" pitchFamily="18" charset="0"/>
+                <a:ea typeface="Cambria" panose="02040503050406030204" pitchFamily="18" charset="0"/>
+              </a:rPr>
+              <a:t>Metodología y Descripción de la herramienta</a:t>
+            </a:r>
+            <a:endParaRPr lang="es-ES" dirty="0"/>
+          </a:p>
+        </p:txBody>
+      </p:sp>
+      <p:sp>
+        <p:nvSpPr>
+          <p:cNvPr id="6" name="CuadroTexto 5"/>
+          <p:cNvSpPr txBox="1"/>
+          <p:nvPr/>
+        </p:nvSpPr>
+        <p:spPr>
+          <a:xfrm>
+            <a:off x="0" y="5528604"/>
+            <a:ext cx="12192000" cy="335388"/>
+          </a:xfrm>
+          <a:prstGeom prst="rect">
+            <a:avLst/>
+          </a:prstGeom>
+          <a:solidFill>
+            <a:schemeClr val="accent1">
+              <a:lumMod val="75000"/>
+            </a:schemeClr>
+          </a:solidFill>
+        </p:spPr>
+        <p:txBody>
+          <a:bodyPr wrap="square" rtlCol="0">
+            <a:spAutoFit/>
+          </a:bodyPr>
+          <a:lstStyle/>
+          <a:p>
+            <a:endParaRPr lang="es-ES" sz="1200" dirty="0"/>
+          </a:p>
+        </p:txBody>
+      </p:sp>
+      <p:pic>
+        <p:nvPicPr>
+          <p:cNvPr id="7" name="Imagen 6" descr="https://www.unir.net/wp-content/uploads/2017/04/logo-h-768x463.png"/>
+          <p:cNvPicPr/>
+          <p:nvPr/>
+        </p:nvPicPr>
+        <p:blipFill>
+          <a:blip r:embed="rId2"/>
+          <a:srcRect t="20870" b="25652"/>
+          <a:stretch>
+            <a:fillRect/>
+          </a:stretch>
+        </p:blipFill>
+        <p:spPr bwMode="auto">
+          <a:xfrm>
+            <a:off x="8856897" y="5818505"/>
+            <a:ext cx="2804160" cy="902970"/>
+          </a:xfrm>
+          <a:prstGeom prst="rect">
+            <a:avLst/>
+          </a:prstGeom>
+          <a:noFill/>
+          <a:ln w="9525">
+            <a:noFill/>
+            <a:miter lim="800000"/>
+            <a:headEnd/>
+            <a:tailEnd/>
+          </a:ln>
+        </p:spPr>
+      </p:pic>
+    </p:spTree>
+    <p:extLst>
+      <p:ext uri="{BB962C8B-B14F-4D97-AF65-F5344CB8AC3E}">
+        <p14:creationId xmlns:p14="http://schemas.microsoft.com/office/powerpoint/2010/main" val="2022242357"/>
+      </p:ext>
+    </p:extLst>
+  </p:cSld>
+  <p:clrMapOvr>
+    <a:masterClrMapping/>
+  </p:clrMapOvr>
+</p:sld>
+</file>
+
+<file path=ppt/slides/slide9.xml><?xml version="1.0" encoding="utf-8"?>
+<p:sld xmlns:a="http://schemas.openxmlformats.org/drawingml/2006/main" xmlns:r="http://schemas.openxmlformats.org/officeDocument/2006/relationships" xmlns:p="http://schemas.openxmlformats.org/presentationml/2006/main">
+  <p:cSld>
+    <p:spTree>
+      <p:nvGrpSpPr>
+        <p:cNvPr id="1" name=""/>
+        <p:cNvGrpSpPr/>
+        <p:nvPr/>
+      </p:nvGrpSpPr>
+      <p:grpSpPr>
+        <a:xfrm>
+          <a:off x="0" y="0"/>
+          <a:ext cx="0" cy="0"/>
+          <a:chOff x="0" y="0"/>
+          <a:chExt cx="0" cy="0"/>
+        </a:xfrm>
+      </p:grpSpPr>
+      <p:sp>
+        <p:nvSpPr>
+          <p:cNvPr id="3" name="Marcador de contenido 2"/>
+          <p:cNvSpPr>
+            <a:spLocks noGrp="1"/>
+          </p:cNvSpPr>
+          <p:nvPr>
+            <p:ph idx="1"/>
+          </p:nvPr>
+        </p:nvSpPr>
+        <p:spPr>
+          <a:xfrm>
+            <a:off x="838200" y="1825625"/>
+            <a:ext cx="10515600" cy="3596381"/>
+          </a:xfrm>
+        </p:spPr>
+        <p:txBody>
+          <a:bodyPr/>
+          <a:lstStyle/>
+          <a:p>
+            <a:endParaRPr lang="es-ES"/>
+          </a:p>
+        </p:txBody>
+      </p:sp>
+      <p:sp>
+        <p:nvSpPr>
+          <p:cNvPr id="4" name="Marcador de pie de página 3"/>
+          <p:cNvSpPr>
+            <a:spLocks noGrp="1"/>
+          </p:cNvSpPr>
+          <p:nvPr>
+            <p:ph type="ftr" sz="quarter" idx="11"/>
+          </p:nvPr>
+        </p:nvSpPr>
+        <p:spPr/>
+        <p:txBody>
+          <a:bodyPr/>
+          <a:lstStyle/>
+          <a:p>
+            <a:r>
+              <a:rPr lang="es-ES" smtClean="0"/>
+              <a:t>Máster Universitario en Análisis y Visualización de Datos Masivos</a:t>
+            </a:r>
+            <a:endParaRPr lang="es-ES"/>
+          </a:p>
+        </p:txBody>
+      </p:sp>
+      <p:sp>
+        <p:nvSpPr>
+          <p:cNvPr id="5" name="Título 1"/>
+          <p:cNvSpPr txBox="1">
+            <a:spLocks/>
+          </p:cNvSpPr>
+          <p:nvPr/>
+        </p:nvSpPr>
+        <p:spPr>
+          <a:xfrm>
+            <a:off x="838200" y="365125"/>
+            <a:ext cx="10515600" cy="1325563"/>
+          </a:xfrm>
+          <a:prstGeom prst="rect">
+            <a:avLst/>
+          </a:prstGeom>
+        </p:spPr>
+        <p:txBody>
+          <a:bodyPr vert="horz" lIns="91440" tIns="45720" rIns="91440" bIns="45720" rtlCol="0" anchor="ctr">
+            <a:normAutofit/>
+          </a:bodyPr>
+          <a:lstStyle>
+            <a:lvl1pPr algn="l" defTabSz="914400" rtl="0" eaLnBrk="1" latinLnBrk="0" hangingPunct="1">
+              <a:lnSpc>
+                <a:spcPct val="90000"/>
+              </a:lnSpc>
+              <a:spcBef>
+                <a:spcPct val="0"/>
+              </a:spcBef>
+              <a:buNone/>
+              <a:defRPr sz="4400" kern="1200">
+                <a:solidFill>
+                  <a:schemeClr val="tx1"/>
+                </a:solidFill>
+                <a:latin typeface="+mj-lt"/>
+                <a:ea typeface="+mj-ea"/>
+                <a:cs typeface="+mj-cs"/>
+              </a:defRPr>
+            </a:lvl1pPr>
+          </a:lstStyle>
+          <a:p>
+            <a:r>
+              <a:rPr lang="es-ES" smtClean="0">
+                <a:latin typeface="Cambria" panose="02040503050406030204" pitchFamily="18" charset="0"/>
+                <a:ea typeface="Cambria" panose="02040503050406030204" pitchFamily="18" charset="0"/>
+              </a:rPr>
+              <a:t>Demo</a:t>
+            </a:r>
+            <a:endParaRPr lang="es-ES" dirty="0"/>
+          </a:p>
+        </p:txBody>
+      </p:sp>
+      <p:sp>
+        <p:nvSpPr>
+          <p:cNvPr id="6" name="CuadroTexto 5"/>
+          <p:cNvSpPr txBox="1"/>
+          <p:nvPr/>
+        </p:nvSpPr>
+        <p:spPr>
+          <a:xfrm>
+            <a:off x="0" y="5528604"/>
+            <a:ext cx="12192000" cy="335388"/>
+          </a:xfrm>
+          <a:prstGeom prst="rect">
+            <a:avLst/>
+          </a:prstGeom>
+          <a:solidFill>
+            <a:schemeClr val="accent1">
+              <a:lumMod val="75000"/>
+            </a:schemeClr>
+          </a:solidFill>
+        </p:spPr>
+        <p:txBody>
+          <a:bodyPr wrap="square" rtlCol="0">
+            <a:spAutoFit/>
+          </a:bodyPr>
+          <a:lstStyle/>
+          <a:p>
+            <a:endParaRPr lang="es-ES" sz="1200" dirty="0"/>
+          </a:p>
+        </p:txBody>
+      </p:sp>
+      <p:pic>
+        <p:nvPicPr>
+          <p:cNvPr id="7" name="Imagen 6" descr="https://www.unir.net/wp-content/uploads/2017/04/logo-h-768x463.png"/>
+          <p:cNvPicPr/>
+          <p:nvPr/>
+        </p:nvPicPr>
+        <p:blipFill>
+          <a:blip r:embed="rId2"/>
+          <a:srcRect t="20870" b="25652"/>
+          <a:stretch>
+            <a:fillRect/>
+          </a:stretch>
+        </p:blipFill>
+        <p:spPr bwMode="auto">
+          <a:xfrm>
+            <a:off x="8856897" y="5818505"/>
+            <a:ext cx="2804160" cy="902970"/>
+          </a:xfrm>
+          <a:prstGeom prst="rect">
+            <a:avLst/>
+          </a:prstGeom>
+          <a:noFill/>
+          <a:ln w="9525">
+            <a:noFill/>
+            <a:miter lim="800000"/>
+            <a:headEnd/>
+            <a:tailEnd/>
+          </a:ln>
+        </p:spPr>
+      </p:pic>
+    </p:spTree>
+    <p:extLst>
+      <p:ext uri="{BB962C8B-B14F-4D97-AF65-F5344CB8AC3E}">
+        <p14:creationId xmlns:p14="http://schemas.microsoft.com/office/powerpoint/2010/main" val="2569106764"/>
+      </p:ext>
+    </p:extLst>
+  </p:cSld>
+  <p:clrMapOvr>
+    <a:masterClrMapping/>
+  </p:clrMapOvr>
 </p:sld>
 </file>
 

</xml_diff>